<commit_message>
adding english button png
</commit_message>
<xml_diff>
--- a/commercial/04_shiny/www/logos.pptx
+++ b/commercial/04_shiny/www/logos.pptx
@@ -104,6 +104,11 @@
       </a:defRPr>
     </a:lvl9pPr>
   </p:defaultTextStyle>
+  <p:extLst>
+    <p:ext uri="{EFAFB233-063F-42B5-8137-9DF3F51BA10A}">
+      <p15:sldGuideLst xmlns:p15="http://schemas.microsoft.com/office/powerpoint/2012/main"/>
+    </p:ext>
+  </p:extLst>
 </p:presentation>
 </file>
 
@@ -238,7 +243,7 @@
           <a:p>
             <a:fld id="{E4181655-DBAA-410F-957C-32704740A8C3}" type="datetimeFigureOut">
               <a:rPr lang="de-DE" smtClean="0"/>
-              <a:t>12.10.2021</a:t>
+              <a:t>13.10.2021</a:t>
             </a:fld>
             <a:endParaRPr lang="de-DE"/>
           </a:p>
@@ -408,7 +413,7 @@
           <a:p>
             <a:fld id="{E4181655-DBAA-410F-957C-32704740A8C3}" type="datetimeFigureOut">
               <a:rPr lang="de-DE" smtClean="0"/>
-              <a:t>12.10.2021</a:t>
+              <a:t>13.10.2021</a:t>
             </a:fld>
             <a:endParaRPr lang="de-DE"/>
           </a:p>
@@ -588,7 +593,7 @@
           <a:p>
             <a:fld id="{E4181655-DBAA-410F-957C-32704740A8C3}" type="datetimeFigureOut">
               <a:rPr lang="de-DE" smtClean="0"/>
-              <a:t>12.10.2021</a:t>
+              <a:t>13.10.2021</a:t>
             </a:fld>
             <a:endParaRPr lang="de-DE"/>
           </a:p>
@@ -758,7 +763,7 @@
           <a:p>
             <a:fld id="{E4181655-DBAA-410F-957C-32704740A8C3}" type="datetimeFigureOut">
               <a:rPr lang="de-DE" smtClean="0"/>
-              <a:t>12.10.2021</a:t>
+              <a:t>13.10.2021</a:t>
             </a:fld>
             <a:endParaRPr lang="de-DE"/>
           </a:p>
@@ -1004,7 +1009,7 @@
           <a:p>
             <a:fld id="{E4181655-DBAA-410F-957C-32704740A8C3}" type="datetimeFigureOut">
               <a:rPr lang="de-DE" smtClean="0"/>
-              <a:t>12.10.2021</a:t>
+              <a:t>13.10.2021</a:t>
             </a:fld>
             <a:endParaRPr lang="de-DE"/>
           </a:p>
@@ -1236,7 +1241,7 @@
           <a:p>
             <a:fld id="{E4181655-DBAA-410F-957C-32704740A8C3}" type="datetimeFigureOut">
               <a:rPr lang="de-DE" smtClean="0"/>
-              <a:t>12.10.2021</a:t>
+              <a:t>13.10.2021</a:t>
             </a:fld>
             <a:endParaRPr lang="de-DE"/>
           </a:p>
@@ -1603,7 +1608,7 @@
           <a:p>
             <a:fld id="{E4181655-DBAA-410F-957C-32704740A8C3}" type="datetimeFigureOut">
               <a:rPr lang="de-DE" smtClean="0"/>
-              <a:t>12.10.2021</a:t>
+              <a:t>13.10.2021</a:t>
             </a:fld>
             <a:endParaRPr lang="de-DE"/>
           </a:p>
@@ -1721,7 +1726,7 @@
           <a:p>
             <a:fld id="{E4181655-DBAA-410F-957C-32704740A8C3}" type="datetimeFigureOut">
               <a:rPr lang="de-DE" smtClean="0"/>
-              <a:t>12.10.2021</a:t>
+              <a:t>13.10.2021</a:t>
             </a:fld>
             <a:endParaRPr lang="de-DE"/>
           </a:p>
@@ -1816,7 +1821,7 @@
           <a:p>
             <a:fld id="{E4181655-DBAA-410F-957C-32704740A8C3}" type="datetimeFigureOut">
               <a:rPr lang="de-DE" smtClean="0"/>
-              <a:t>12.10.2021</a:t>
+              <a:t>13.10.2021</a:t>
             </a:fld>
             <a:endParaRPr lang="de-DE"/>
           </a:p>
@@ -2093,7 +2098,7 @@
           <a:p>
             <a:fld id="{E4181655-DBAA-410F-957C-32704740A8C3}" type="datetimeFigureOut">
               <a:rPr lang="de-DE" smtClean="0"/>
-              <a:t>12.10.2021</a:t>
+              <a:t>13.10.2021</a:t>
             </a:fld>
             <a:endParaRPr lang="de-DE"/>
           </a:p>
@@ -2346,7 +2351,7 @@
           <a:p>
             <a:fld id="{E4181655-DBAA-410F-957C-32704740A8C3}" type="datetimeFigureOut">
               <a:rPr lang="de-DE" smtClean="0"/>
-              <a:t>12.10.2021</a:t>
+              <a:t>13.10.2021</a:t>
             </a:fld>
             <a:endParaRPr lang="de-DE"/>
           </a:p>
@@ -2559,7 +2564,7 @@
           <a:p>
             <a:fld id="{E4181655-DBAA-410F-957C-32704740A8C3}" type="datetimeFigureOut">
               <a:rPr lang="de-DE" smtClean="0"/>
-              <a:t>12.10.2021</a:t>
+              <a:t>13.10.2021</a:t>
             </a:fld>
             <a:endParaRPr lang="de-DE"/>
           </a:p>
@@ -3921,6 +3926,1154 @@
           </a:prstGeom>
         </p:spPr>
       </p:pic>
+      <p:grpSp>
+        <p:nvGrpSpPr>
+          <p:cNvPr id="53" name="Gruppieren 52"/>
+          <p:cNvGrpSpPr/>
+          <p:nvPr/>
+        </p:nvGrpSpPr>
+        <p:grpSpPr>
+          <a:xfrm>
+            <a:off x="4822136" y="4842183"/>
+            <a:ext cx="2757901" cy="2060550"/>
+            <a:chOff x="1503220" y="1482221"/>
+            <a:chExt cx="2757901" cy="2060550"/>
+          </a:xfrm>
+        </p:grpSpPr>
+        <p:pic>
+          <p:nvPicPr>
+            <p:cNvPr id="54" name="Grafik 53"/>
+            <p:cNvPicPr>
+              <a:picLocks noChangeAspect="1"/>
+            </p:cNvPicPr>
+            <p:nvPr/>
+          </p:nvPicPr>
+          <p:blipFill rotWithShape="1">
+            <a:blip r:embed="rId2"/>
+            <a:srcRect r="80600"/>
+            <a:stretch/>
+          </p:blipFill>
+          <p:spPr>
+            <a:xfrm>
+              <a:off x="1503220" y="1498237"/>
+              <a:ext cx="532789" cy="1901266"/>
+            </a:xfrm>
+            <a:prstGeom prst="rect">
+              <a:avLst/>
+            </a:prstGeom>
+          </p:spPr>
+        </p:pic>
+        <p:pic>
+          <p:nvPicPr>
+            <p:cNvPr id="55" name="Grafik 54"/>
+            <p:cNvPicPr>
+              <a:picLocks noChangeAspect="1"/>
+            </p:cNvPicPr>
+            <p:nvPr/>
+          </p:nvPicPr>
+          <p:blipFill rotWithShape="1">
+            <a:blip r:embed="rId2"/>
+            <a:srcRect r="80600"/>
+            <a:stretch/>
+          </p:blipFill>
+          <p:spPr>
+            <a:xfrm>
+              <a:off x="2246415" y="1482221"/>
+              <a:ext cx="532789" cy="1901266"/>
+            </a:xfrm>
+            <a:prstGeom prst="rect">
+              <a:avLst/>
+            </a:prstGeom>
+          </p:spPr>
+        </p:pic>
+        <p:pic>
+          <p:nvPicPr>
+            <p:cNvPr id="56" name="Grafik 55"/>
+            <p:cNvPicPr>
+              <a:picLocks noChangeAspect="1"/>
+            </p:cNvPicPr>
+            <p:nvPr/>
+          </p:nvPicPr>
+          <p:blipFill rotWithShape="1">
+            <a:blip r:embed="rId2"/>
+            <a:srcRect r="80600"/>
+            <a:stretch/>
+          </p:blipFill>
+          <p:spPr>
+            <a:xfrm>
+              <a:off x="2762992" y="1555115"/>
+              <a:ext cx="532789" cy="1901266"/>
+            </a:xfrm>
+            <a:prstGeom prst="rect">
+              <a:avLst/>
+            </a:prstGeom>
+          </p:spPr>
+        </p:pic>
+        <p:pic>
+          <p:nvPicPr>
+            <p:cNvPr id="57" name="Grafik 56"/>
+            <p:cNvPicPr>
+              <a:picLocks noChangeAspect="1"/>
+            </p:cNvPicPr>
+            <p:nvPr/>
+          </p:nvPicPr>
+          <p:blipFill rotWithShape="1">
+            <a:blip r:embed="rId2"/>
+            <a:srcRect r="80600"/>
+            <a:stretch/>
+          </p:blipFill>
+          <p:spPr>
+            <a:xfrm>
+              <a:off x="3236658" y="1563257"/>
+              <a:ext cx="532789" cy="1901266"/>
+            </a:xfrm>
+            <a:prstGeom prst="rect">
+              <a:avLst/>
+            </a:prstGeom>
+          </p:spPr>
+        </p:pic>
+        <p:pic>
+          <p:nvPicPr>
+            <p:cNvPr id="58" name="Grafik 57"/>
+            <p:cNvPicPr>
+              <a:picLocks noChangeAspect="1"/>
+            </p:cNvPicPr>
+            <p:nvPr/>
+          </p:nvPicPr>
+          <p:blipFill rotWithShape="1">
+            <a:blip r:embed="rId2"/>
+            <a:srcRect r="80600"/>
+            <a:stretch/>
+          </p:blipFill>
+          <p:spPr>
+            <a:xfrm>
+              <a:off x="3728332" y="1563257"/>
+              <a:ext cx="532789" cy="1901266"/>
+            </a:xfrm>
+            <a:prstGeom prst="rect">
+              <a:avLst/>
+            </a:prstGeom>
+          </p:spPr>
+        </p:pic>
+        <p:pic>
+          <p:nvPicPr>
+            <p:cNvPr id="59" name="Grafik 58"/>
+            <p:cNvPicPr>
+              <a:picLocks noChangeAspect="1"/>
+            </p:cNvPicPr>
+            <p:nvPr/>
+          </p:nvPicPr>
+          <p:blipFill rotWithShape="1">
+            <a:blip r:embed="rId2"/>
+            <a:srcRect r="80600"/>
+            <a:stretch/>
+          </p:blipFill>
+          <p:spPr>
+            <a:xfrm>
+              <a:off x="1967799" y="1498237"/>
+              <a:ext cx="532789" cy="1901266"/>
+            </a:xfrm>
+            <a:prstGeom prst="rect">
+              <a:avLst/>
+            </a:prstGeom>
+          </p:spPr>
+        </p:pic>
+        <p:pic>
+          <p:nvPicPr>
+            <p:cNvPr id="61" name="Grafik 60"/>
+            <p:cNvPicPr>
+              <a:picLocks noChangeAspect="1"/>
+            </p:cNvPicPr>
+            <p:nvPr/>
+          </p:nvPicPr>
+          <p:blipFill>
+            <a:blip r:embed="rId3"/>
+            <a:stretch>
+              <a:fillRect/>
+            </a:stretch>
+          </p:blipFill>
+          <p:spPr>
+            <a:xfrm>
+              <a:off x="3883535" y="1973618"/>
+              <a:ext cx="256054" cy="256054"/>
+            </a:xfrm>
+            <a:prstGeom prst="rect">
+              <a:avLst/>
+            </a:prstGeom>
+          </p:spPr>
+        </p:pic>
+        <p:pic>
+          <p:nvPicPr>
+            <p:cNvPr id="62" name="Grafik 61"/>
+            <p:cNvPicPr>
+              <a:picLocks noChangeAspect="1"/>
+            </p:cNvPicPr>
+            <p:nvPr/>
+          </p:nvPicPr>
+          <p:blipFill>
+            <a:blip r:embed="rId4"/>
+            <a:stretch>
+              <a:fillRect/>
+            </a:stretch>
+          </p:blipFill>
+          <p:spPr>
+            <a:xfrm rot="10800000">
+              <a:off x="1507404" y="3256234"/>
+              <a:ext cx="2749534" cy="286537"/>
+            </a:xfrm>
+            <a:prstGeom prst="rect">
+              <a:avLst/>
+            </a:prstGeom>
+          </p:spPr>
+        </p:pic>
+        <p:sp>
+          <p:nvSpPr>
+            <p:cNvPr id="65" name="Textfeld 64"/>
+            <p:cNvSpPr txBox="1"/>
+            <p:nvPr/>
+          </p:nvSpPr>
+          <p:spPr>
+            <a:xfrm>
+              <a:off x="1507403" y="2101437"/>
+              <a:ext cx="2746274" cy="1292662"/>
+            </a:xfrm>
+            <a:prstGeom prst="rect">
+              <a:avLst/>
+            </a:prstGeom>
+            <a:noFill/>
+          </p:spPr>
+          <p:txBody>
+            <a:bodyPr wrap="square" rtlCol="0">
+              <a:spAutoFit/>
+            </a:bodyPr>
+            <a:lstStyle/>
+            <a:p>
+              <a:pPr algn="ctr"/>
+              <a:r>
+                <a:rPr lang="de-DE" sz="4000" b="1" dirty="0" smtClean="0">
+                  <a:solidFill>
+                    <a:schemeClr val="bg1"/>
+                  </a:solidFill>
+                </a:rPr>
+                <a:t>Sampling</a:t>
+              </a:r>
+              <a:endParaRPr lang="de-DE" sz="4000" b="1" dirty="0" smtClean="0">
+                <a:solidFill>
+                  <a:schemeClr val="bg1"/>
+                </a:solidFill>
+              </a:endParaRPr>
+            </a:p>
+            <a:p>
+              <a:pPr algn="ctr"/>
+              <a:endParaRPr lang="de-DE" sz="1200" b="1" dirty="0">
+                <a:solidFill>
+                  <a:schemeClr val="bg1"/>
+                </a:solidFill>
+              </a:endParaRPr>
+            </a:p>
+            <a:p>
+              <a:pPr algn="ctr"/>
+              <a:r>
+                <a:rPr lang="de-DE" sz="1300" b="1" dirty="0" smtClean="0">
+                  <a:solidFill>
+                    <a:schemeClr val="bg1"/>
+                  </a:solidFill>
+                </a:rPr>
+                <a:t>Sampling </a:t>
+              </a:r>
+              <a:r>
+                <a:rPr lang="de-DE" sz="1300" b="1" dirty="0" err="1" smtClean="0">
+                  <a:solidFill>
+                    <a:schemeClr val="bg1"/>
+                  </a:solidFill>
+                </a:rPr>
+                <a:t>data</a:t>
+              </a:r>
+              <a:r>
+                <a:rPr lang="de-DE" sz="1300" b="1" dirty="0" smtClean="0">
+                  <a:solidFill>
+                    <a:schemeClr val="bg1"/>
+                  </a:solidFill>
+                </a:rPr>
+                <a:t>, cruise </a:t>
+              </a:r>
+              <a:r>
+                <a:rPr lang="de-DE" sz="1300" b="1" dirty="0" err="1" smtClean="0">
+                  <a:solidFill>
+                    <a:schemeClr val="bg1"/>
+                  </a:solidFill>
+                </a:rPr>
+                <a:t>reports</a:t>
+              </a:r>
+              <a:r>
+                <a:rPr lang="de-DE" sz="1300" b="1" dirty="0" smtClean="0">
+                  <a:solidFill>
+                    <a:schemeClr val="bg1"/>
+                  </a:solidFill>
+                </a:rPr>
+                <a:t> </a:t>
+              </a:r>
+              <a:r>
+                <a:rPr lang="de-DE" sz="1300" b="1" dirty="0" err="1" smtClean="0">
+                  <a:solidFill>
+                    <a:schemeClr val="bg1"/>
+                  </a:solidFill>
+                </a:rPr>
+                <a:t>and</a:t>
+              </a:r>
+              <a:r>
+                <a:rPr lang="de-DE" sz="1300" b="1" dirty="0" smtClean="0">
+                  <a:solidFill>
+                    <a:schemeClr val="bg1"/>
+                  </a:solidFill>
+                </a:rPr>
+                <a:t> </a:t>
+              </a:r>
+              <a:r>
+                <a:rPr lang="de-DE" sz="1300" b="1" dirty="0" err="1" smtClean="0">
+                  <a:solidFill>
+                    <a:schemeClr val="bg1"/>
+                  </a:solidFill>
+                </a:rPr>
+                <a:t>overviews</a:t>
+              </a:r>
+              <a:endParaRPr lang="de-DE" sz="1300" b="1" dirty="0">
+                <a:solidFill>
+                  <a:schemeClr val="bg1"/>
+                </a:solidFill>
+              </a:endParaRPr>
+            </a:p>
+          </p:txBody>
+        </p:sp>
+      </p:grpSp>
+      <p:grpSp>
+        <p:nvGrpSpPr>
+          <p:cNvPr id="66" name="Gruppieren 65"/>
+          <p:cNvGrpSpPr/>
+          <p:nvPr/>
+        </p:nvGrpSpPr>
+        <p:grpSpPr>
+          <a:xfrm>
+            <a:off x="1503220" y="4842183"/>
+            <a:ext cx="2757901" cy="2060550"/>
+            <a:chOff x="1503220" y="1482221"/>
+            <a:chExt cx="2757901" cy="2060550"/>
+          </a:xfrm>
+        </p:grpSpPr>
+        <p:pic>
+          <p:nvPicPr>
+            <p:cNvPr id="67" name="Grafik 66"/>
+            <p:cNvPicPr>
+              <a:picLocks noChangeAspect="1"/>
+            </p:cNvPicPr>
+            <p:nvPr/>
+          </p:nvPicPr>
+          <p:blipFill rotWithShape="1">
+            <a:blip r:embed="rId2"/>
+            <a:srcRect r="80600"/>
+            <a:stretch/>
+          </p:blipFill>
+          <p:spPr>
+            <a:xfrm>
+              <a:off x="1503220" y="1498237"/>
+              <a:ext cx="532789" cy="1901266"/>
+            </a:xfrm>
+            <a:prstGeom prst="rect">
+              <a:avLst/>
+            </a:prstGeom>
+          </p:spPr>
+        </p:pic>
+        <p:pic>
+          <p:nvPicPr>
+            <p:cNvPr id="68" name="Grafik 67"/>
+            <p:cNvPicPr>
+              <a:picLocks noChangeAspect="1"/>
+            </p:cNvPicPr>
+            <p:nvPr/>
+          </p:nvPicPr>
+          <p:blipFill rotWithShape="1">
+            <a:blip r:embed="rId2"/>
+            <a:srcRect r="80600"/>
+            <a:stretch/>
+          </p:blipFill>
+          <p:spPr>
+            <a:xfrm>
+              <a:off x="2246415" y="1482221"/>
+              <a:ext cx="532789" cy="1901266"/>
+            </a:xfrm>
+            <a:prstGeom prst="rect">
+              <a:avLst/>
+            </a:prstGeom>
+          </p:spPr>
+        </p:pic>
+        <p:pic>
+          <p:nvPicPr>
+            <p:cNvPr id="69" name="Grafik 68"/>
+            <p:cNvPicPr>
+              <a:picLocks noChangeAspect="1"/>
+            </p:cNvPicPr>
+            <p:nvPr/>
+          </p:nvPicPr>
+          <p:blipFill rotWithShape="1">
+            <a:blip r:embed="rId2"/>
+            <a:srcRect r="80600"/>
+            <a:stretch/>
+          </p:blipFill>
+          <p:spPr>
+            <a:xfrm>
+              <a:off x="2762992" y="1555115"/>
+              <a:ext cx="532789" cy="1901266"/>
+            </a:xfrm>
+            <a:prstGeom prst="rect">
+              <a:avLst/>
+            </a:prstGeom>
+          </p:spPr>
+        </p:pic>
+        <p:pic>
+          <p:nvPicPr>
+            <p:cNvPr id="70" name="Grafik 69"/>
+            <p:cNvPicPr>
+              <a:picLocks noChangeAspect="1"/>
+            </p:cNvPicPr>
+            <p:nvPr/>
+          </p:nvPicPr>
+          <p:blipFill rotWithShape="1">
+            <a:blip r:embed="rId2"/>
+            <a:srcRect r="80600"/>
+            <a:stretch/>
+          </p:blipFill>
+          <p:spPr>
+            <a:xfrm>
+              <a:off x="3236658" y="1563257"/>
+              <a:ext cx="532789" cy="1901266"/>
+            </a:xfrm>
+            <a:prstGeom prst="rect">
+              <a:avLst/>
+            </a:prstGeom>
+          </p:spPr>
+        </p:pic>
+        <p:pic>
+          <p:nvPicPr>
+            <p:cNvPr id="71" name="Grafik 70"/>
+            <p:cNvPicPr>
+              <a:picLocks noChangeAspect="1"/>
+            </p:cNvPicPr>
+            <p:nvPr/>
+          </p:nvPicPr>
+          <p:blipFill rotWithShape="1">
+            <a:blip r:embed="rId2"/>
+            <a:srcRect r="80600"/>
+            <a:stretch/>
+          </p:blipFill>
+          <p:spPr>
+            <a:xfrm>
+              <a:off x="3728332" y="1563257"/>
+              <a:ext cx="532789" cy="1901266"/>
+            </a:xfrm>
+            <a:prstGeom prst="rect">
+              <a:avLst/>
+            </a:prstGeom>
+          </p:spPr>
+        </p:pic>
+        <p:pic>
+          <p:nvPicPr>
+            <p:cNvPr id="72" name="Grafik 71"/>
+            <p:cNvPicPr>
+              <a:picLocks noChangeAspect="1"/>
+            </p:cNvPicPr>
+            <p:nvPr/>
+          </p:nvPicPr>
+          <p:blipFill rotWithShape="1">
+            <a:blip r:embed="rId2"/>
+            <a:srcRect r="80600"/>
+            <a:stretch/>
+          </p:blipFill>
+          <p:spPr>
+            <a:xfrm>
+              <a:off x="1967799" y="1498237"/>
+              <a:ext cx="532789" cy="1901266"/>
+            </a:xfrm>
+            <a:prstGeom prst="rect">
+              <a:avLst/>
+            </a:prstGeom>
+          </p:spPr>
+        </p:pic>
+        <p:pic>
+          <p:nvPicPr>
+            <p:cNvPr id="73" name="Grafik 72"/>
+            <p:cNvPicPr>
+              <a:picLocks noChangeAspect="1"/>
+            </p:cNvPicPr>
+            <p:nvPr/>
+          </p:nvPicPr>
+          <p:blipFill>
+            <a:blip r:embed="rId3"/>
+            <a:stretch>
+              <a:fillRect/>
+            </a:stretch>
+          </p:blipFill>
+          <p:spPr>
+            <a:xfrm>
+              <a:off x="3883535" y="1973618"/>
+              <a:ext cx="256054" cy="256054"/>
+            </a:xfrm>
+            <a:prstGeom prst="rect">
+              <a:avLst/>
+            </a:prstGeom>
+          </p:spPr>
+        </p:pic>
+        <p:pic>
+          <p:nvPicPr>
+            <p:cNvPr id="74" name="Grafik 73"/>
+            <p:cNvPicPr>
+              <a:picLocks noChangeAspect="1"/>
+            </p:cNvPicPr>
+            <p:nvPr/>
+          </p:nvPicPr>
+          <p:blipFill>
+            <a:blip r:embed="rId4"/>
+            <a:stretch>
+              <a:fillRect/>
+            </a:stretch>
+          </p:blipFill>
+          <p:spPr>
+            <a:xfrm rot="10800000">
+              <a:off x="1507404" y="3256234"/>
+              <a:ext cx="2749534" cy="286537"/>
+            </a:xfrm>
+            <a:prstGeom prst="rect">
+              <a:avLst/>
+            </a:prstGeom>
+          </p:spPr>
+        </p:pic>
+        <p:sp>
+          <p:nvSpPr>
+            <p:cNvPr id="75" name="Textfeld 74"/>
+            <p:cNvSpPr txBox="1"/>
+            <p:nvPr/>
+          </p:nvSpPr>
+          <p:spPr>
+            <a:xfrm>
+              <a:off x="1507403" y="2101437"/>
+              <a:ext cx="2746274" cy="1292662"/>
+            </a:xfrm>
+            <a:prstGeom prst="rect">
+              <a:avLst/>
+            </a:prstGeom>
+            <a:noFill/>
+          </p:spPr>
+          <p:txBody>
+            <a:bodyPr wrap="square" rtlCol="0">
+              <a:spAutoFit/>
+            </a:bodyPr>
+            <a:lstStyle/>
+            <a:p>
+              <a:pPr algn="ctr"/>
+              <a:r>
+                <a:rPr lang="de-DE" sz="4000" b="1" dirty="0" err="1" smtClean="0">
+                  <a:solidFill>
+                    <a:schemeClr val="bg1"/>
+                  </a:solidFill>
+                </a:rPr>
+                <a:t>Fishery</a:t>
+              </a:r>
+              <a:endParaRPr lang="de-DE" sz="4000" b="1" dirty="0" smtClean="0">
+                <a:solidFill>
+                  <a:schemeClr val="bg1"/>
+                </a:solidFill>
+              </a:endParaRPr>
+            </a:p>
+            <a:p>
+              <a:pPr algn="ctr"/>
+              <a:endParaRPr lang="de-DE" sz="1200" b="1" dirty="0">
+                <a:solidFill>
+                  <a:schemeClr val="bg1"/>
+                </a:solidFill>
+              </a:endParaRPr>
+            </a:p>
+            <a:p>
+              <a:pPr algn="ctr"/>
+              <a:r>
+                <a:rPr lang="de-DE" sz="1300" b="1" dirty="0" smtClean="0">
+                  <a:solidFill>
+                    <a:schemeClr val="bg1"/>
+                  </a:solidFill>
+                </a:rPr>
+                <a:t>National </a:t>
+              </a:r>
+              <a:r>
+                <a:rPr lang="de-DE" sz="1300" b="1" dirty="0" err="1" smtClean="0">
+                  <a:solidFill>
+                    <a:schemeClr val="bg1"/>
+                  </a:solidFill>
+                </a:rPr>
+                <a:t>data</a:t>
+              </a:r>
+              <a:r>
+                <a:rPr lang="de-DE" sz="1300" b="1" dirty="0" smtClean="0">
+                  <a:solidFill>
+                    <a:schemeClr val="bg1"/>
+                  </a:solidFill>
+                </a:rPr>
+                <a:t> on </a:t>
+              </a:r>
+              <a:r>
+                <a:rPr lang="de-DE" sz="1300" b="1" dirty="0" err="1" smtClean="0">
+                  <a:solidFill>
+                    <a:schemeClr val="bg1"/>
+                  </a:solidFill>
+                </a:rPr>
+                <a:t>fleet</a:t>
+              </a:r>
+              <a:r>
+                <a:rPr lang="de-DE" sz="1300" b="1" dirty="0" smtClean="0">
+                  <a:solidFill>
+                    <a:schemeClr val="bg1"/>
+                  </a:solidFill>
+                </a:rPr>
+                <a:t> </a:t>
+              </a:r>
+              <a:r>
+                <a:rPr lang="de-DE" sz="1300" b="1" dirty="0" err="1" smtClean="0">
+                  <a:solidFill>
+                    <a:schemeClr val="bg1"/>
+                  </a:solidFill>
+                </a:rPr>
+                <a:t>structure</a:t>
+              </a:r>
+              <a:r>
+                <a:rPr lang="de-DE" sz="1300" b="1" dirty="0" smtClean="0">
+                  <a:solidFill>
+                    <a:schemeClr val="bg1"/>
+                  </a:solidFill>
+                </a:rPr>
+                <a:t>, </a:t>
+              </a:r>
+              <a:r>
+                <a:rPr lang="de-DE" sz="1300" b="1" dirty="0" err="1" smtClean="0">
+                  <a:solidFill>
+                    <a:schemeClr val="bg1"/>
+                  </a:solidFill>
+                </a:rPr>
+                <a:t>landings</a:t>
+              </a:r>
+              <a:r>
+                <a:rPr lang="de-DE" sz="1300" b="1" dirty="0" smtClean="0">
+                  <a:solidFill>
+                    <a:schemeClr val="bg1"/>
+                  </a:solidFill>
+                </a:rPr>
+                <a:t> </a:t>
+              </a:r>
+              <a:r>
+                <a:rPr lang="de-DE" sz="1300" b="1" dirty="0" err="1" smtClean="0">
+                  <a:solidFill>
+                    <a:schemeClr val="bg1"/>
+                  </a:solidFill>
+                </a:rPr>
+                <a:t>and</a:t>
+              </a:r>
+              <a:r>
+                <a:rPr lang="de-DE" sz="1300" b="1" dirty="0" smtClean="0">
+                  <a:solidFill>
+                    <a:schemeClr val="bg1"/>
+                  </a:solidFill>
+                </a:rPr>
+                <a:t> </a:t>
+              </a:r>
+              <a:r>
+                <a:rPr lang="de-DE" sz="1300" b="1" dirty="0" err="1" smtClean="0">
+                  <a:solidFill>
+                    <a:schemeClr val="bg1"/>
+                  </a:solidFill>
+                </a:rPr>
+                <a:t>effort</a:t>
+              </a:r>
+              <a:endParaRPr lang="de-DE" sz="1300" b="1" dirty="0">
+                <a:solidFill>
+                  <a:schemeClr val="bg1"/>
+                </a:solidFill>
+              </a:endParaRPr>
+            </a:p>
+          </p:txBody>
+        </p:sp>
+      </p:grpSp>
+      <p:pic>
+        <p:nvPicPr>
+          <p:cNvPr id="76" name="Grafik 75"/>
+          <p:cNvPicPr>
+            <a:picLocks noChangeAspect="1"/>
+          </p:cNvPicPr>
+          <p:nvPr/>
+        </p:nvPicPr>
+        <p:blipFill rotWithShape="1">
+          <a:blip r:embed="rId2"/>
+          <a:srcRect l="5438" t="6108" r="85254" b="80446"/>
+          <a:stretch/>
+        </p:blipFill>
+        <p:spPr>
+          <a:xfrm>
+            <a:off x="10540181" y="5333580"/>
+            <a:ext cx="255640" cy="255638"/>
+          </a:xfrm>
+          <a:prstGeom prst="rect">
+            <a:avLst/>
+          </a:prstGeom>
+        </p:spPr>
+      </p:pic>
+      <p:pic>
+        <p:nvPicPr>
+          <p:cNvPr id="77" name="Grafik 76"/>
+          <p:cNvPicPr>
+            <a:picLocks noChangeAspect="1"/>
+          </p:cNvPicPr>
+          <p:nvPr/>
+        </p:nvPicPr>
+        <p:blipFill rotWithShape="1">
+          <a:blip r:embed="rId2"/>
+          <a:srcRect b="4684"/>
+          <a:stretch/>
+        </p:blipFill>
+        <p:spPr>
+          <a:xfrm>
+            <a:off x="1507404" y="3769843"/>
+            <a:ext cx="2746273" cy="1812209"/>
+          </a:xfrm>
+          <a:prstGeom prst="rect">
+            <a:avLst/>
+          </a:prstGeom>
+        </p:spPr>
+      </p:pic>
+      <p:pic>
+        <p:nvPicPr>
+          <p:cNvPr id="78" name="Grafik 77"/>
+          <p:cNvPicPr>
+            <a:picLocks noChangeAspect="1"/>
+          </p:cNvPicPr>
+          <p:nvPr/>
+        </p:nvPicPr>
+        <p:blipFill rotWithShape="1">
+          <a:blip r:embed="rId5"/>
+          <a:srcRect b="7270"/>
+          <a:stretch/>
+        </p:blipFill>
+        <p:spPr>
+          <a:xfrm>
+            <a:off x="4817805" y="3769843"/>
+            <a:ext cx="2762232" cy="1763048"/>
+          </a:xfrm>
+          <a:prstGeom prst="rect">
+            <a:avLst/>
+          </a:prstGeom>
+        </p:spPr>
+      </p:pic>
+      <p:grpSp>
+        <p:nvGrpSpPr>
+          <p:cNvPr id="79" name="Gruppieren 78"/>
+          <p:cNvGrpSpPr/>
+          <p:nvPr/>
+        </p:nvGrpSpPr>
+        <p:grpSpPr>
+          <a:xfrm>
+            <a:off x="8146777" y="4858199"/>
+            <a:ext cx="2757901" cy="2060550"/>
+            <a:chOff x="1503220" y="1482221"/>
+            <a:chExt cx="2757901" cy="2060550"/>
+          </a:xfrm>
+        </p:grpSpPr>
+        <p:pic>
+          <p:nvPicPr>
+            <p:cNvPr id="80" name="Grafik 79"/>
+            <p:cNvPicPr>
+              <a:picLocks noChangeAspect="1"/>
+            </p:cNvPicPr>
+            <p:nvPr/>
+          </p:nvPicPr>
+          <p:blipFill rotWithShape="1">
+            <a:blip r:embed="rId2"/>
+            <a:srcRect r="80600"/>
+            <a:stretch/>
+          </p:blipFill>
+          <p:spPr>
+            <a:xfrm>
+              <a:off x="1503220" y="1498237"/>
+              <a:ext cx="532789" cy="1901266"/>
+            </a:xfrm>
+            <a:prstGeom prst="rect">
+              <a:avLst/>
+            </a:prstGeom>
+          </p:spPr>
+        </p:pic>
+        <p:pic>
+          <p:nvPicPr>
+            <p:cNvPr id="81" name="Grafik 80"/>
+            <p:cNvPicPr>
+              <a:picLocks noChangeAspect="1"/>
+            </p:cNvPicPr>
+            <p:nvPr/>
+          </p:nvPicPr>
+          <p:blipFill rotWithShape="1">
+            <a:blip r:embed="rId2"/>
+            <a:srcRect r="80600"/>
+            <a:stretch/>
+          </p:blipFill>
+          <p:spPr>
+            <a:xfrm>
+              <a:off x="2246415" y="1482221"/>
+              <a:ext cx="532789" cy="1901266"/>
+            </a:xfrm>
+            <a:prstGeom prst="rect">
+              <a:avLst/>
+            </a:prstGeom>
+          </p:spPr>
+        </p:pic>
+        <p:pic>
+          <p:nvPicPr>
+            <p:cNvPr id="82" name="Grafik 81"/>
+            <p:cNvPicPr>
+              <a:picLocks noChangeAspect="1"/>
+            </p:cNvPicPr>
+            <p:nvPr/>
+          </p:nvPicPr>
+          <p:blipFill rotWithShape="1">
+            <a:blip r:embed="rId2"/>
+            <a:srcRect r="80600"/>
+            <a:stretch/>
+          </p:blipFill>
+          <p:spPr>
+            <a:xfrm>
+              <a:off x="2762992" y="1555115"/>
+              <a:ext cx="532789" cy="1901266"/>
+            </a:xfrm>
+            <a:prstGeom prst="rect">
+              <a:avLst/>
+            </a:prstGeom>
+          </p:spPr>
+        </p:pic>
+        <p:pic>
+          <p:nvPicPr>
+            <p:cNvPr id="83" name="Grafik 82"/>
+            <p:cNvPicPr>
+              <a:picLocks noChangeAspect="1"/>
+            </p:cNvPicPr>
+            <p:nvPr/>
+          </p:nvPicPr>
+          <p:blipFill rotWithShape="1">
+            <a:blip r:embed="rId2"/>
+            <a:srcRect r="80600"/>
+            <a:stretch/>
+          </p:blipFill>
+          <p:spPr>
+            <a:xfrm>
+              <a:off x="3236658" y="1563257"/>
+              <a:ext cx="532789" cy="1901266"/>
+            </a:xfrm>
+            <a:prstGeom prst="rect">
+              <a:avLst/>
+            </a:prstGeom>
+          </p:spPr>
+        </p:pic>
+        <p:pic>
+          <p:nvPicPr>
+            <p:cNvPr id="84" name="Grafik 83"/>
+            <p:cNvPicPr>
+              <a:picLocks noChangeAspect="1"/>
+            </p:cNvPicPr>
+            <p:nvPr/>
+          </p:nvPicPr>
+          <p:blipFill rotWithShape="1">
+            <a:blip r:embed="rId2"/>
+            <a:srcRect r="80600"/>
+            <a:stretch/>
+          </p:blipFill>
+          <p:spPr>
+            <a:xfrm>
+              <a:off x="3728332" y="1563257"/>
+              <a:ext cx="532789" cy="1901266"/>
+            </a:xfrm>
+            <a:prstGeom prst="rect">
+              <a:avLst/>
+            </a:prstGeom>
+          </p:spPr>
+        </p:pic>
+        <p:pic>
+          <p:nvPicPr>
+            <p:cNvPr id="85" name="Grafik 84"/>
+            <p:cNvPicPr>
+              <a:picLocks noChangeAspect="1"/>
+            </p:cNvPicPr>
+            <p:nvPr/>
+          </p:nvPicPr>
+          <p:blipFill rotWithShape="1">
+            <a:blip r:embed="rId2"/>
+            <a:srcRect r="80600"/>
+            <a:stretch/>
+          </p:blipFill>
+          <p:spPr>
+            <a:xfrm>
+              <a:off x="1967799" y="1498237"/>
+              <a:ext cx="532789" cy="1901266"/>
+            </a:xfrm>
+            <a:prstGeom prst="rect">
+              <a:avLst/>
+            </a:prstGeom>
+          </p:spPr>
+        </p:pic>
+        <p:pic>
+          <p:nvPicPr>
+            <p:cNvPr id="86" name="Grafik 85"/>
+            <p:cNvPicPr>
+              <a:picLocks noChangeAspect="1"/>
+            </p:cNvPicPr>
+            <p:nvPr/>
+          </p:nvPicPr>
+          <p:blipFill>
+            <a:blip r:embed="rId3"/>
+            <a:stretch>
+              <a:fillRect/>
+            </a:stretch>
+          </p:blipFill>
+          <p:spPr>
+            <a:xfrm>
+              <a:off x="3883535" y="1973618"/>
+              <a:ext cx="256054" cy="256054"/>
+            </a:xfrm>
+            <a:prstGeom prst="rect">
+              <a:avLst/>
+            </a:prstGeom>
+          </p:spPr>
+        </p:pic>
+        <p:pic>
+          <p:nvPicPr>
+            <p:cNvPr id="87" name="Grafik 86"/>
+            <p:cNvPicPr>
+              <a:picLocks noChangeAspect="1"/>
+            </p:cNvPicPr>
+            <p:nvPr/>
+          </p:nvPicPr>
+          <p:blipFill>
+            <a:blip r:embed="rId4"/>
+            <a:stretch>
+              <a:fillRect/>
+            </a:stretch>
+          </p:blipFill>
+          <p:spPr>
+            <a:xfrm rot="10800000">
+              <a:off x="1507404" y="3256234"/>
+              <a:ext cx="2749534" cy="286537"/>
+            </a:xfrm>
+            <a:prstGeom prst="rect">
+              <a:avLst/>
+            </a:prstGeom>
+          </p:spPr>
+        </p:pic>
+        <p:sp>
+          <p:nvSpPr>
+            <p:cNvPr id="88" name="Textfeld 87"/>
+            <p:cNvSpPr txBox="1"/>
+            <p:nvPr/>
+          </p:nvSpPr>
+          <p:spPr>
+            <a:xfrm>
+              <a:off x="1507403" y="2101437"/>
+              <a:ext cx="2746274" cy="1292662"/>
+            </a:xfrm>
+            <a:prstGeom prst="rect">
+              <a:avLst/>
+            </a:prstGeom>
+            <a:noFill/>
+          </p:spPr>
+          <p:txBody>
+            <a:bodyPr wrap="square" rtlCol="0">
+              <a:spAutoFit/>
+            </a:bodyPr>
+            <a:lstStyle/>
+            <a:p>
+              <a:pPr algn="ctr"/>
+              <a:r>
+                <a:rPr lang="de-DE" sz="4000" b="1" dirty="0" err="1" smtClean="0">
+                  <a:solidFill>
+                    <a:schemeClr val="bg1"/>
+                  </a:solidFill>
+                </a:rPr>
+                <a:t>Biology</a:t>
+              </a:r>
+              <a:endParaRPr lang="de-DE" sz="4000" b="1" dirty="0" smtClean="0">
+                <a:solidFill>
+                  <a:schemeClr val="bg1"/>
+                </a:solidFill>
+              </a:endParaRPr>
+            </a:p>
+            <a:p>
+              <a:pPr algn="ctr"/>
+              <a:endParaRPr lang="de-DE" sz="1200" b="1" dirty="0">
+                <a:solidFill>
+                  <a:schemeClr val="bg1"/>
+                </a:solidFill>
+              </a:endParaRPr>
+            </a:p>
+            <a:p>
+              <a:pPr algn="ctr"/>
+              <a:r>
+                <a:rPr lang="de-DE" sz="1300" b="1" dirty="0" smtClean="0">
+                  <a:solidFill>
+                    <a:schemeClr val="bg1"/>
+                  </a:solidFill>
+                </a:rPr>
+                <a:t>Biological </a:t>
+              </a:r>
+              <a:r>
+                <a:rPr lang="de-DE" sz="1300" b="1" dirty="0" err="1" smtClean="0">
+                  <a:solidFill>
+                    <a:schemeClr val="bg1"/>
+                  </a:solidFill>
+                </a:rPr>
+                <a:t>parameter</a:t>
+              </a:r>
+              <a:r>
+                <a:rPr lang="de-DE" sz="1300" b="1" dirty="0" smtClean="0">
+                  <a:solidFill>
+                    <a:schemeClr val="bg1"/>
+                  </a:solidFill>
+                </a:rPr>
+                <a:t>, stock variables </a:t>
+              </a:r>
+              <a:r>
+                <a:rPr lang="de-DE" sz="1300" b="1" dirty="0" err="1" smtClean="0">
+                  <a:solidFill>
+                    <a:schemeClr val="bg1"/>
+                  </a:solidFill>
+                </a:rPr>
+                <a:t>and</a:t>
+              </a:r>
+              <a:r>
+                <a:rPr lang="de-DE" sz="1300" b="1" dirty="0" smtClean="0">
+                  <a:solidFill>
+                    <a:schemeClr val="bg1"/>
+                  </a:solidFill>
+                </a:rPr>
+                <a:t> </a:t>
+              </a:r>
+              <a:r>
+                <a:rPr lang="de-DE" sz="1300" b="1" dirty="0" err="1" smtClean="0">
+                  <a:solidFill>
+                    <a:schemeClr val="bg1"/>
+                  </a:solidFill>
+                </a:rPr>
+                <a:t>overviews</a:t>
+              </a:r>
+              <a:r>
+                <a:rPr lang="de-DE" sz="1300" b="1" dirty="0" smtClean="0">
+                  <a:solidFill>
+                    <a:schemeClr val="bg1"/>
+                  </a:solidFill>
+                </a:rPr>
+                <a:t> </a:t>
+              </a:r>
+              <a:endParaRPr lang="de-DE" sz="1300" b="1" dirty="0">
+                <a:solidFill>
+                  <a:schemeClr val="bg1"/>
+                </a:solidFill>
+              </a:endParaRPr>
+            </a:p>
+          </p:txBody>
+        </p:sp>
+      </p:grpSp>
+      <p:pic>
+        <p:nvPicPr>
+          <p:cNvPr id="89" name="Grafik 88"/>
+          <p:cNvPicPr>
+            <a:picLocks noChangeAspect="1"/>
+          </p:cNvPicPr>
+          <p:nvPr/>
+        </p:nvPicPr>
+        <p:blipFill rotWithShape="1">
+          <a:blip r:embed="rId6"/>
+          <a:srcRect b="7270"/>
+          <a:stretch/>
+        </p:blipFill>
+        <p:spPr>
+          <a:xfrm>
+            <a:off x="8147869" y="3769843"/>
+            <a:ext cx="2749365" cy="1763048"/>
+          </a:xfrm>
+          <a:prstGeom prst="rect">
+            <a:avLst/>
+          </a:prstGeom>
+        </p:spPr>
+      </p:pic>
+      <p:pic>
+        <p:nvPicPr>
+          <p:cNvPr id="90" name="Grafik 89"/>
+          <p:cNvPicPr>
+            <a:picLocks noChangeAspect="1"/>
+          </p:cNvPicPr>
+          <p:nvPr/>
+        </p:nvPicPr>
+        <p:blipFill>
+          <a:blip r:embed="rId3"/>
+          <a:stretch>
+            <a:fillRect/>
+          </a:stretch>
+        </p:blipFill>
+        <p:spPr>
+          <a:xfrm>
+            <a:off x="3955387" y="5311928"/>
+            <a:ext cx="256054" cy="256054"/>
+          </a:xfrm>
+          <a:prstGeom prst="rect">
+            <a:avLst/>
+          </a:prstGeom>
+        </p:spPr>
+      </p:pic>
+      <p:pic>
+        <p:nvPicPr>
+          <p:cNvPr id="91" name="Grafik 90"/>
+          <p:cNvPicPr>
+            <a:picLocks noChangeAspect="1"/>
+          </p:cNvPicPr>
+          <p:nvPr/>
+        </p:nvPicPr>
+        <p:blipFill>
+          <a:blip r:embed="rId3"/>
+          <a:stretch>
+            <a:fillRect/>
+          </a:stretch>
+        </p:blipFill>
+        <p:spPr>
+          <a:xfrm>
+            <a:off x="7237045" y="5305209"/>
+            <a:ext cx="256054" cy="256054"/>
+          </a:xfrm>
+          <a:prstGeom prst="rect">
+            <a:avLst/>
+          </a:prstGeom>
+        </p:spPr>
+      </p:pic>
+      <p:pic>
+        <p:nvPicPr>
+          <p:cNvPr id="92" name="Grafik 91"/>
+          <p:cNvPicPr>
+            <a:picLocks noChangeAspect="1"/>
+          </p:cNvPicPr>
+          <p:nvPr/>
+        </p:nvPicPr>
+        <p:blipFill>
+          <a:blip r:embed="rId3"/>
+          <a:stretch>
+            <a:fillRect/>
+          </a:stretch>
+        </p:blipFill>
+        <p:spPr>
+          <a:xfrm>
+            <a:off x="10524319" y="5349388"/>
+            <a:ext cx="256054" cy="256054"/>
+          </a:xfrm>
+          <a:prstGeom prst="rect">
+            <a:avLst/>
+          </a:prstGeom>
+        </p:spPr>
+      </p:pic>
     </p:spTree>
     <p:extLst>
       <p:ext uri="{BB962C8B-B14F-4D97-AF65-F5344CB8AC3E}">

</xml_diff>